<commit_message>
point out dimple for wurth spdt switch
</commit_message>
<xml_diff>
--- a/Files_for_AssemblyHouse/Digicom_RFQ.pptx
+++ b/Files_for_AssemblyHouse/Digicom_RFQ.pptx
@@ -109,6 +109,11 @@
       </a:defRPr>
     </a:lvl9pPr>
   </p:defaultTextStyle>
+  <p:extLst>
+    <p:ext uri="{EFAFB233-063F-42B5-8137-9DF3F51BA10A}">
+      <p15:sldGuideLst xmlns:p15="http://schemas.microsoft.com/office/powerpoint/2012/main"/>
+    </p:ext>
+  </p:extLst>
 </p:presentation>
 </file>
 
@@ -4389,7 +4394,7 @@
         <p:spPr>
           <a:xfrm>
             <a:off x="368827" y="702469"/>
-            <a:ext cx="4679692" cy="4154984"/>
+            <a:ext cx="4679692" cy="5509200"/>
           </a:xfrm>
           <a:prstGeom prst="rect">
             <a:avLst/>
@@ -4422,6 +4427,15 @@
             <a:r>
               <a:rPr lang="en-US" sz="2200" dirty="0"/>
               <a:t>. be careful not to rotate 180 degrees).</a:t>
+            </a:r>
+          </a:p>
+          <a:p>
+            <a:endParaRPr lang="en-US" sz="2200" dirty="0"/>
+          </a:p>
+          <a:p>
+            <a:r>
+              <a:rPr lang="en-US" sz="2200" dirty="0"/>
+              <a:t>The switch has a circular dimple that indicates the location of pin 3 (see blue arrow).</a:t>
             </a:r>
           </a:p>
           <a:p>
@@ -4505,7 +4519,7 @@
         </p:blipFill>
         <p:spPr>
           <a:xfrm>
-            <a:off x="6096000" y="2586344"/>
+            <a:off x="7143483" y="2289477"/>
             <a:ext cx="2162477" cy="2353003"/>
           </a:xfrm>
           <a:prstGeom prst="rect">
@@ -4543,6 +4557,83 @@
           </a:prstGeom>
         </p:spPr>
       </p:pic>
+      <p:pic>
+        <p:nvPicPr>
+          <p:cNvPr id="5" name="Picture 4">
+            <a:extLst>
+              <a:ext uri="{FF2B5EF4-FFF2-40B4-BE49-F238E27FC236}">
+                <a16:creationId xmlns:a16="http://schemas.microsoft.com/office/drawing/2014/main" id="{6E9608FF-7F0B-06E3-9835-DF6552CB6398}"/>
+              </a:ext>
+            </a:extLst>
+          </p:cNvPr>
+          <p:cNvPicPr>
+            <a:picLocks noChangeAspect="1"/>
+          </p:cNvPicPr>
+          <p:nvPr/>
+        </p:nvPicPr>
+        <p:blipFill>
+          <a:blip r:embed="rId8"/>
+          <a:stretch>
+            <a:fillRect/>
+          </a:stretch>
+        </p:blipFill>
+        <p:spPr>
+          <a:xfrm>
+            <a:off x="4939709" y="4519229"/>
+            <a:ext cx="4077269" cy="2259616"/>
+          </a:xfrm>
+          <a:prstGeom prst="rect">
+            <a:avLst/>
+          </a:prstGeom>
+        </p:spPr>
+      </p:pic>
+      <p:cxnSp>
+        <p:nvCxnSpPr>
+          <p:cNvPr id="8" name="Straight Arrow Connector 7">
+            <a:extLst>
+              <a:ext uri="{FF2B5EF4-FFF2-40B4-BE49-F238E27FC236}">
+                <a16:creationId xmlns:a16="http://schemas.microsoft.com/office/drawing/2014/main" id="{0F10E683-D338-4497-7C8E-90F2C2662B1F}"/>
+              </a:ext>
+            </a:extLst>
+          </p:cNvPr>
+          <p:cNvCxnSpPr>
+            <a:cxnSpLocks/>
+          </p:cNvCxnSpPr>
+          <p:nvPr/>
+        </p:nvCxnSpPr>
+        <p:spPr>
+          <a:xfrm>
+            <a:off x="5116202" y="4244829"/>
+            <a:ext cx="2995952" cy="939567"/>
+          </a:xfrm>
+          <a:prstGeom prst="straightConnector1">
+            <a:avLst/>
+          </a:prstGeom>
+          <a:ln w="38100" cap="flat" cmpd="sng" algn="ctr">
+            <a:solidFill>
+              <a:schemeClr val="accent1"/>
+            </a:solidFill>
+            <a:prstDash val="solid"/>
+            <a:round/>
+            <a:headEnd type="none" w="med" len="med"/>
+            <a:tailEnd type="arrow" w="med" len="med"/>
+          </a:ln>
+        </p:spPr>
+        <p:style>
+          <a:lnRef idx="0">
+            <a:scrgbClr r="0" g="0" b="0"/>
+          </a:lnRef>
+          <a:fillRef idx="0">
+            <a:scrgbClr r="0" g="0" b="0"/>
+          </a:fillRef>
+          <a:effectRef idx="0">
+            <a:scrgbClr r="0" g="0" b="0"/>
+          </a:effectRef>
+          <a:fontRef idx="minor">
+            <a:schemeClr val="tx1"/>
+          </a:fontRef>
+        </p:style>
+      </p:cxnSp>
     </p:spTree>
     <p:extLst>
       <p:ext uri="{BB962C8B-B14F-4D97-AF65-F5344CB8AC3E}">

</xml_diff>